<commit_message>
Präsentation Arduino Nano Software
</commit_message>
<xml_diff>
--- a/Dokumentation/Externe Projekte/Präsentation/Bienendrohne Teil Tim.pptx
+++ b/Dokumentation/Externe Projekte/Präsentation/Bienendrohne Teil Tim.pptx
@@ -5,7 +5,7 @@
     <p:sldMasterId id="2147483707" r:id="rId1"/>
   </p:sldMasterIdLst>
   <p:notesMasterIdLst>
-    <p:notesMasterId r:id="rId15"/>
+    <p:notesMasterId r:id="rId16"/>
   </p:notesMasterIdLst>
   <p:sldIdLst>
     <p:sldId id="256" r:id="rId2"/>
@@ -19,8 +19,9 @@
     <p:sldId id="266" r:id="rId10"/>
     <p:sldId id="267" r:id="rId11"/>
     <p:sldId id="261" r:id="rId12"/>
-    <p:sldId id="262" r:id="rId13"/>
-    <p:sldId id="268" r:id="rId14"/>
+    <p:sldId id="269" r:id="rId13"/>
+    <p:sldId id="262" r:id="rId14"/>
+    <p:sldId id="268" r:id="rId15"/>
   </p:sldIdLst>
   <p:sldSz cx="9144000" cy="6858000" type="screen4x3"/>
   <p:notesSz cx="6858000" cy="9144000"/>
@@ -220,7 +221,7 @@
           <a:p>
             <a:fld id="{C11727E0-91CD-444A-9422-F7C958AFCEAC}" type="datetimeFigureOut">
               <a:rPr lang="de-DE" smtClean="0"/>
-              <a:t>15.06.2018</a:t>
+              <a:t>18.06.2018</a:t>
             </a:fld>
             <a:endParaRPr lang="de-DE"/>
           </a:p>
@@ -895,7 +896,7 @@
           <a:p>
             <a:fld id="{6BBDE0CE-4CFD-4B43-9818-2D49E9011334}" type="datetimeFigureOut">
               <a:rPr lang="de-DE" smtClean="0"/>
-              <a:t>15.06.2018</a:t>
+              <a:t>18.06.2018</a:t>
             </a:fld>
             <a:endParaRPr lang="de-DE"/>
           </a:p>
@@ -1170,7 +1171,7 @@
           <a:p>
             <a:fld id="{6BBDE0CE-4CFD-4B43-9818-2D49E9011334}" type="datetimeFigureOut">
               <a:rPr lang="de-DE" smtClean="0"/>
-              <a:t>15.06.2018</a:t>
+              <a:t>18.06.2018</a:t>
             </a:fld>
             <a:endParaRPr lang="de-DE"/>
           </a:p>
@@ -1364,7 +1365,7 @@
           <a:p>
             <a:fld id="{6BBDE0CE-4CFD-4B43-9818-2D49E9011334}" type="datetimeFigureOut">
               <a:rPr lang="de-DE" smtClean="0"/>
-              <a:t>15.06.2018</a:t>
+              <a:t>18.06.2018</a:t>
             </a:fld>
             <a:endParaRPr lang="de-DE"/>
           </a:p>
@@ -1632,7 +1633,7 @@
           <a:p>
             <a:fld id="{6BBDE0CE-4CFD-4B43-9818-2D49E9011334}" type="datetimeFigureOut">
               <a:rPr lang="de-DE" smtClean="0"/>
-              <a:t>15.06.2018</a:t>
+              <a:t>18.06.2018</a:t>
             </a:fld>
             <a:endParaRPr lang="de-DE"/>
           </a:p>
@@ -1964,7 +1965,7 @@
           <a:p>
             <a:fld id="{6BBDE0CE-4CFD-4B43-9818-2D49E9011334}" type="datetimeFigureOut">
               <a:rPr lang="de-DE" smtClean="0"/>
-              <a:t>15.06.2018</a:t>
+              <a:t>18.06.2018</a:t>
             </a:fld>
             <a:endParaRPr lang="de-DE"/>
           </a:p>
@@ -2574,7 +2575,7 @@
           <a:p>
             <a:fld id="{6BBDE0CE-4CFD-4B43-9818-2D49E9011334}" type="datetimeFigureOut">
               <a:rPr lang="de-DE" smtClean="0"/>
-              <a:t>15.06.2018</a:t>
+              <a:t>18.06.2018</a:t>
             </a:fld>
             <a:endParaRPr lang="de-DE"/>
           </a:p>
@@ -3421,7 +3422,7 @@
           <a:p>
             <a:fld id="{6BBDE0CE-4CFD-4B43-9818-2D49E9011334}" type="datetimeFigureOut">
               <a:rPr lang="de-DE" smtClean="0"/>
-              <a:t>15.06.2018</a:t>
+              <a:t>18.06.2018</a:t>
             </a:fld>
             <a:endParaRPr lang="de-DE"/>
           </a:p>
@@ -3591,7 +3592,7 @@
           <a:p>
             <a:fld id="{6BBDE0CE-4CFD-4B43-9818-2D49E9011334}" type="datetimeFigureOut">
               <a:rPr lang="de-DE" smtClean="0"/>
-              <a:t>15.06.2018</a:t>
+              <a:t>18.06.2018</a:t>
             </a:fld>
             <a:endParaRPr lang="de-DE"/>
           </a:p>
@@ -3771,7 +3772,7 @@
           <a:p>
             <a:fld id="{6BBDE0CE-4CFD-4B43-9818-2D49E9011334}" type="datetimeFigureOut">
               <a:rPr lang="de-DE" smtClean="0"/>
-              <a:t>15.06.2018</a:t>
+              <a:t>18.06.2018</a:t>
             </a:fld>
             <a:endParaRPr lang="de-DE"/>
           </a:p>
@@ -3941,7 +3942,7 @@
           <a:p>
             <a:fld id="{6BBDE0CE-4CFD-4B43-9818-2D49E9011334}" type="datetimeFigureOut">
               <a:rPr lang="de-DE" smtClean="0"/>
-              <a:t>15.06.2018</a:t>
+              <a:t>18.06.2018</a:t>
             </a:fld>
             <a:endParaRPr lang="de-DE"/>
           </a:p>
@@ -4185,7 +4186,7 @@
           <a:p>
             <a:fld id="{6BBDE0CE-4CFD-4B43-9818-2D49E9011334}" type="datetimeFigureOut">
               <a:rPr lang="de-DE" smtClean="0"/>
-              <a:t>15.06.2018</a:t>
+              <a:t>18.06.2018</a:t>
             </a:fld>
             <a:endParaRPr lang="de-DE"/>
           </a:p>
@@ -4477,7 +4478,7 @@
           <a:p>
             <a:fld id="{6BBDE0CE-4CFD-4B43-9818-2D49E9011334}" type="datetimeFigureOut">
               <a:rPr lang="de-DE" smtClean="0"/>
-              <a:t>15.06.2018</a:t>
+              <a:t>18.06.2018</a:t>
             </a:fld>
             <a:endParaRPr lang="de-DE"/>
           </a:p>
@@ -4915,7 +4916,7 @@
           <a:p>
             <a:fld id="{6BBDE0CE-4CFD-4B43-9818-2D49E9011334}" type="datetimeFigureOut">
               <a:rPr lang="de-DE" smtClean="0"/>
-              <a:t>15.06.2018</a:t>
+              <a:t>18.06.2018</a:t>
             </a:fld>
             <a:endParaRPr lang="de-DE"/>
           </a:p>
@@ -5033,7 +5034,7 @@
           <a:p>
             <a:fld id="{6BBDE0CE-4CFD-4B43-9818-2D49E9011334}" type="datetimeFigureOut">
               <a:rPr lang="de-DE" smtClean="0"/>
-              <a:t>15.06.2018</a:t>
+              <a:t>18.06.2018</a:t>
             </a:fld>
             <a:endParaRPr lang="de-DE"/>
           </a:p>
@@ -5128,7 +5129,7 @@
           <a:p>
             <a:fld id="{6BBDE0CE-4CFD-4B43-9818-2D49E9011334}" type="datetimeFigureOut">
               <a:rPr lang="de-DE" smtClean="0"/>
-              <a:t>15.06.2018</a:t>
+              <a:t>18.06.2018</a:t>
             </a:fld>
             <a:endParaRPr lang="de-DE"/>
           </a:p>
@@ -5407,7 +5408,7 @@
           <a:p>
             <a:fld id="{6BBDE0CE-4CFD-4B43-9818-2D49E9011334}" type="datetimeFigureOut">
               <a:rPr lang="de-DE" smtClean="0"/>
-              <a:t>15.06.2018</a:t>
+              <a:t>18.06.2018</a:t>
             </a:fld>
             <a:endParaRPr lang="de-DE"/>
           </a:p>
@@ -5682,7 +5683,7 @@
           <a:p>
             <a:fld id="{6BBDE0CE-4CFD-4B43-9818-2D49E9011334}" type="datetimeFigureOut">
               <a:rPr lang="de-DE" smtClean="0"/>
-              <a:t>15.06.2018</a:t>
+              <a:t>18.06.2018</a:t>
             </a:fld>
             <a:endParaRPr lang="de-DE"/>
           </a:p>
@@ -6247,7 +6248,7 @@
           <a:p>
             <a:fld id="{6BBDE0CE-4CFD-4B43-9818-2D49E9011334}" type="datetimeFigureOut">
               <a:rPr lang="de-DE" smtClean="0"/>
-              <a:t>15.06.2018</a:t>
+              <a:t>18.06.2018</a:t>
             </a:fld>
             <a:endParaRPr lang="de-DE"/>
           </a:p>
@@ -7199,6 +7200,136 @@
       </p:grpSpPr>
       <p:sp>
         <p:nvSpPr>
+          <p:cNvPr id="5" name="Rechteck 4"/>
+          <p:cNvSpPr/>
+          <p:nvPr/>
+        </p:nvSpPr>
+        <p:spPr>
+          <a:xfrm>
+            <a:off x="524786" y="1484784"/>
+            <a:ext cx="1495002" cy="512480"/>
+          </a:xfrm>
+          <a:prstGeom prst="rect">
+            <a:avLst/>
+          </a:prstGeom>
+        </p:spPr>
+        <p:style>
+          <a:lnRef idx="2">
+            <a:schemeClr val="accent1">
+              <a:shade val="50000"/>
+            </a:schemeClr>
+          </a:lnRef>
+          <a:fillRef idx="1">
+            <a:schemeClr val="accent1"/>
+          </a:fillRef>
+          <a:effectRef idx="0">
+            <a:schemeClr val="accent1"/>
+          </a:effectRef>
+          <a:fontRef idx="minor">
+            <a:schemeClr val="lt1"/>
+          </a:fontRef>
+        </p:style>
+        <p:txBody>
+          <a:bodyPr rtlCol="0" anchor="ctr"/>
+          <a:lstStyle/>
+          <a:p>
+            <a:pPr algn="ctr"/>
+            <a:endParaRPr lang="de-DE"/>
+          </a:p>
+        </p:txBody>
+      </p:sp>
+      <p:sp>
+        <p:nvSpPr>
+          <p:cNvPr id="2" name="Titel 1"/>
+          <p:cNvSpPr>
+            <a:spLocks noGrp="1"/>
+          </p:cNvSpPr>
+          <p:nvPr>
+            <p:ph type="title"/>
+          </p:nvPr>
+        </p:nvSpPr>
+        <p:spPr/>
+        <p:txBody>
+          <a:bodyPr/>
+          <a:lstStyle/>
+          <a:p>
+            <a:r>
+              <a:rPr lang="de-DE" dirty="0" smtClean="0"/>
+              <a:t>Lagensteuerung</a:t>
+            </a:r>
+            <a:endParaRPr lang="de-DE" dirty="0"/>
+          </a:p>
+        </p:txBody>
+      </p:sp>
+      <p:pic>
+        <p:nvPicPr>
+          <p:cNvPr id="7" name="Grafik 6"/>
+          <p:cNvPicPr>
+            <a:picLocks noChangeAspect="1"/>
+          </p:cNvPicPr>
+          <p:nvPr/>
+        </p:nvPicPr>
+        <p:blipFill>
+          <a:blip r:embed="rId2">
+            <a:extLst>
+              <a:ext uri="{28A0092B-C50C-407E-A947-70E740481C1C}">
+                <a14:useLocalDpi xmlns:a14="http://schemas.microsoft.com/office/drawing/2010/main" val="0"/>
+              </a:ext>
+            </a:extLst>
+          </a:blip>
+          <a:stretch>
+            <a:fillRect/>
+          </a:stretch>
+        </p:blipFill>
+        <p:spPr>
+          <a:xfrm>
+            <a:off x="0" y="1628800"/>
+            <a:ext cx="9144000" cy="4315776"/>
+          </a:xfrm>
+          <a:prstGeom prst="rect">
+            <a:avLst/>
+          </a:prstGeom>
+        </p:spPr>
+      </p:pic>
+    </p:spTree>
+    <p:extLst>
+      <p:ext uri="{BB962C8B-B14F-4D97-AF65-F5344CB8AC3E}">
+        <p14:creationId xmlns:p14="http://schemas.microsoft.com/office/powerpoint/2010/main" val="3146276998"/>
+      </p:ext>
+    </p:extLst>
+  </p:cSld>
+  <p:clrMapOvr>
+    <a:masterClrMapping/>
+  </p:clrMapOvr>
+  <p:timing>
+    <p:tnLst>
+      <p:par>
+        <p:cTn id="1" dur="indefinite" restart="never" nodeType="tmRoot"/>
+      </p:par>
+    </p:tnLst>
+  </p:timing>
+</p:sld>
+</file>
+
+<file path=ppt/slides/slide13.xml><?xml version="1.0" encoding="utf-8"?>
+<p:sld xmlns:a="http://schemas.openxmlformats.org/drawingml/2006/main" xmlns:r="http://schemas.openxmlformats.org/officeDocument/2006/relationships" xmlns:p="http://schemas.openxmlformats.org/presentationml/2006/main">
+  <p:cSld>
+    <p:spTree>
+      <p:nvGrpSpPr>
+        <p:cNvPr id="1" name=""/>
+        <p:cNvGrpSpPr/>
+        <p:nvPr/>
+      </p:nvGrpSpPr>
+      <p:grpSpPr>
+        <a:xfrm>
+          <a:off x="0" y="0"/>
+          <a:ext cx="0" cy="0"/>
+          <a:chOff x="0" y="0"/>
+          <a:chExt cx="0" cy="0"/>
+        </a:xfrm>
+      </p:grpSpPr>
+      <p:sp>
+        <p:nvSpPr>
           <p:cNvPr id="2" name="Titel 1"/>
           <p:cNvSpPr>
             <a:spLocks noGrp="1"/>
@@ -7269,7 +7400,7 @@
 </p:sld>
 </file>
 
-<file path=ppt/slides/slide13.xml><?xml version="1.0" encoding="utf-8"?>
+<file path=ppt/slides/slide14.xml><?xml version="1.0" encoding="utf-8"?>
 <p:sld xmlns:a="http://schemas.openxmlformats.org/drawingml/2006/main" xmlns:r="http://schemas.openxmlformats.org/officeDocument/2006/relationships" xmlns:p="http://schemas.openxmlformats.org/presentationml/2006/main">
   <p:cSld>
     <p:spTree>

</xml_diff>